<commit_message>
updated lecture slides for QMD
</commit_message>
<xml_diff>
--- a/resources/CyberMAGICS_partipant_template.pptx
+++ b/resources/CyberMAGICS_partipant_template.pptx
@@ -259,7 +259,7 @@
           <a:p>
             <a:fld id="{5F85E91E-9825-D54C-94DC-AF4DA7DCCDDF}" type="datetimeFigureOut">
               <a:rPr lang="en-US" smtClean="0"/>
-              <a:t>6/26/23</a:t>
+              <a:t>6/17/24</a:t>
             </a:fld>
             <a:endParaRPr lang="en-US"/>
           </a:p>
@@ -457,7 +457,7 @@
           <a:p>
             <a:fld id="{5F85E91E-9825-D54C-94DC-AF4DA7DCCDDF}" type="datetimeFigureOut">
               <a:rPr lang="en-US" smtClean="0"/>
-              <a:t>6/26/23</a:t>
+              <a:t>6/17/24</a:t>
             </a:fld>
             <a:endParaRPr lang="en-US"/>
           </a:p>
@@ -665,7 +665,7 @@
           <a:p>
             <a:fld id="{5F85E91E-9825-D54C-94DC-AF4DA7DCCDDF}" type="datetimeFigureOut">
               <a:rPr lang="en-US" smtClean="0"/>
-              <a:t>6/26/23</a:t>
+              <a:t>6/17/24</a:t>
             </a:fld>
             <a:endParaRPr lang="en-US"/>
           </a:p>
@@ -863,7 +863,7 @@
           <a:p>
             <a:fld id="{5F85E91E-9825-D54C-94DC-AF4DA7DCCDDF}" type="datetimeFigureOut">
               <a:rPr lang="en-US" smtClean="0"/>
-              <a:t>6/26/23</a:t>
+              <a:t>6/17/24</a:t>
             </a:fld>
             <a:endParaRPr lang="en-US"/>
           </a:p>
@@ -1138,7 +1138,7 @@
           <a:p>
             <a:fld id="{5F85E91E-9825-D54C-94DC-AF4DA7DCCDDF}" type="datetimeFigureOut">
               <a:rPr lang="en-US" smtClean="0"/>
-              <a:t>6/26/23</a:t>
+              <a:t>6/17/24</a:t>
             </a:fld>
             <a:endParaRPr lang="en-US"/>
           </a:p>
@@ -1403,7 +1403,7 @@
           <a:p>
             <a:fld id="{5F85E91E-9825-D54C-94DC-AF4DA7DCCDDF}" type="datetimeFigureOut">
               <a:rPr lang="en-US" smtClean="0"/>
-              <a:t>6/26/23</a:t>
+              <a:t>6/17/24</a:t>
             </a:fld>
             <a:endParaRPr lang="en-US"/>
           </a:p>
@@ -1815,7 +1815,7 @@
           <a:p>
             <a:fld id="{5F85E91E-9825-D54C-94DC-AF4DA7DCCDDF}" type="datetimeFigureOut">
               <a:rPr lang="en-US" smtClean="0"/>
-              <a:t>6/26/23</a:t>
+              <a:t>6/17/24</a:t>
             </a:fld>
             <a:endParaRPr lang="en-US"/>
           </a:p>
@@ -1956,7 +1956,7 @@
           <a:p>
             <a:fld id="{5F85E91E-9825-D54C-94DC-AF4DA7DCCDDF}" type="datetimeFigureOut">
               <a:rPr lang="en-US" smtClean="0"/>
-              <a:t>6/26/23</a:t>
+              <a:t>6/17/24</a:t>
             </a:fld>
             <a:endParaRPr lang="en-US"/>
           </a:p>
@@ -2069,7 +2069,7 @@
           <a:p>
             <a:fld id="{5F85E91E-9825-D54C-94DC-AF4DA7DCCDDF}" type="datetimeFigureOut">
               <a:rPr lang="en-US" smtClean="0"/>
-              <a:t>6/26/23</a:t>
+              <a:t>6/17/24</a:t>
             </a:fld>
             <a:endParaRPr lang="en-US"/>
           </a:p>
@@ -2380,7 +2380,7 @@
           <a:p>
             <a:fld id="{5F85E91E-9825-D54C-94DC-AF4DA7DCCDDF}" type="datetimeFigureOut">
               <a:rPr lang="en-US" smtClean="0"/>
-              <a:t>6/26/23</a:t>
+              <a:t>6/17/24</a:t>
             </a:fld>
             <a:endParaRPr lang="en-US"/>
           </a:p>
@@ -2668,7 +2668,7 @@
           <a:p>
             <a:fld id="{5F85E91E-9825-D54C-94DC-AF4DA7DCCDDF}" type="datetimeFigureOut">
               <a:rPr lang="en-US" smtClean="0"/>
-              <a:t>6/26/23</a:t>
+              <a:t>6/17/24</a:t>
             </a:fld>
             <a:endParaRPr lang="en-US"/>
           </a:p>
@@ -2909,7 +2909,7 @@
           <a:p>
             <a:fld id="{5F85E91E-9825-D54C-94DC-AF4DA7DCCDDF}" type="datetimeFigureOut">
               <a:rPr lang="en-US" smtClean="0"/>
-              <a:t>6/26/23</a:t>
+              <a:t>6/17/24</a:t>
             </a:fld>
             <a:endParaRPr lang="en-US"/>
           </a:p>
@@ -3789,13 +3789,8 @@
             </a:r>
             <a:r>
               <a:rPr lang="en-US" dirty="0"/>
-              <a:t> Workshop, June 29 – July 1</a:t>
-            </a:r>
-            <a:r>
-              <a:rPr lang="en-US"/>
-              <a:t>, 2023</a:t>
-            </a:r>
-            <a:endParaRPr lang="en-US" dirty="0"/>
+              <a:t> Workshop, June 25-26, 2024</a:t>
+            </a:r>
           </a:p>
         </p:txBody>
       </p:sp>

</xml_diff>

<commit_message>
updated the participant-introduction template
</commit_message>
<xml_diff>
--- a/resources/CyberMAGICS_partipant_template.pptx
+++ b/resources/CyberMAGICS_partipant_template.pptx
@@ -259,7 +259,7 @@
           <a:p>
             <a:fld id="{5F85E91E-9825-D54C-94DC-AF4DA7DCCDDF}" type="datetimeFigureOut">
               <a:rPr lang="en-US" smtClean="0"/>
-              <a:t>6/17/24</a:t>
+              <a:t>6/5/25</a:t>
             </a:fld>
             <a:endParaRPr lang="en-US"/>
           </a:p>
@@ -457,7 +457,7 @@
           <a:p>
             <a:fld id="{5F85E91E-9825-D54C-94DC-AF4DA7DCCDDF}" type="datetimeFigureOut">
               <a:rPr lang="en-US" smtClean="0"/>
-              <a:t>6/17/24</a:t>
+              <a:t>6/5/25</a:t>
             </a:fld>
             <a:endParaRPr lang="en-US"/>
           </a:p>
@@ -665,7 +665,7 @@
           <a:p>
             <a:fld id="{5F85E91E-9825-D54C-94DC-AF4DA7DCCDDF}" type="datetimeFigureOut">
               <a:rPr lang="en-US" smtClean="0"/>
-              <a:t>6/17/24</a:t>
+              <a:t>6/5/25</a:t>
             </a:fld>
             <a:endParaRPr lang="en-US"/>
           </a:p>
@@ -863,7 +863,7 @@
           <a:p>
             <a:fld id="{5F85E91E-9825-D54C-94DC-AF4DA7DCCDDF}" type="datetimeFigureOut">
               <a:rPr lang="en-US" smtClean="0"/>
-              <a:t>6/17/24</a:t>
+              <a:t>6/5/25</a:t>
             </a:fld>
             <a:endParaRPr lang="en-US"/>
           </a:p>
@@ -1138,7 +1138,7 @@
           <a:p>
             <a:fld id="{5F85E91E-9825-D54C-94DC-AF4DA7DCCDDF}" type="datetimeFigureOut">
               <a:rPr lang="en-US" smtClean="0"/>
-              <a:t>6/17/24</a:t>
+              <a:t>6/5/25</a:t>
             </a:fld>
             <a:endParaRPr lang="en-US"/>
           </a:p>
@@ -1403,7 +1403,7 @@
           <a:p>
             <a:fld id="{5F85E91E-9825-D54C-94DC-AF4DA7DCCDDF}" type="datetimeFigureOut">
               <a:rPr lang="en-US" smtClean="0"/>
-              <a:t>6/17/24</a:t>
+              <a:t>6/5/25</a:t>
             </a:fld>
             <a:endParaRPr lang="en-US"/>
           </a:p>
@@ -1815,7 +1815,7 @@
           <a:p>
             <a:fld id="{5F85E91E-9825-D54C-94DC-AF4DA7DCCDDF}" type="datetimeFigureOut">
               <a:rPr lang="en-US" smtClean="0"/>
-              <a:t>6/17/24</a:t>
+              <a:t>6/5/25</a:t>
             </a:fld>
             <a:endParaRPr lang="en-US"/>
           </a:p>
@@ -1956,7 +1956,7 @@
           <a:p>
             <a:fld id="{5F85E91E-9825-D54C-94DC-AF4DA7DCCDDF}" type="datetimeFigureOut">
               <a:rPr lang="en-US" smtClean="0"/>
-              <a:t>6/17/24</a:t>
+              <a:t>6/5/25</a:t>
             </a:fld>
             <a:endParaRPr lang="en-US"/>
           </a:p>
@@ -2069,7 +2069,7 @@
           <a:p>
             <a:fld id="{5F85E91E-9825-D54C-94DC-AF4DA7DCCDDF}" type="datetimeFigureOut">
               <a:rPr lang="en-US" smtClean="0"/>
-              <a:t>6/17/24</a:t>
+              <a:t>6/5/25</a:t>
             </a:fld>
             <a:endParaRPr lang="en-US"/>
           </a:p>
@@ -2380,7 +2380,7 @@
           <a:p>
             <a:fld id="{5F85E91E-9825-D54C-94DC-AF4DA7DCCDDF}" type="datetimeFigureOut">
               <a:rPr lang="en-US" smtClean="0"/>
-              <a:t>6/17/24</a:t>
+              <a:t>6/5/25</a:t>
             </a:fld>
             <a:endParaRPr lang="en-US"/>
           </a:p>
@@ -2668,7 +2668,7 @@
           <a:p>
             <a:fld id="{5F85E91E-9825-D54C-94DC-AF4DA7DCCDDF}" type="datetimeFigureOut">
               <a:rPr lang="en-US" smtClean="0"/>
-              <a:t>6/17/24</a:t>
+              <a:t>6/5/25</a:t>
             </a:fld>
             <a:endParaRPr lang="en-US"/>
           </a:p>
@@ -2909,7 +2909,7 @@
           <a:p>
             <a:fld id="{5F85E91E-9825-D54C-94DC-AF4DA7DCCDDF}" type="datetimeFigureOut">
               <a:rPr lang="en-US" smtClean="0"/>
-              <a:t>6/17/24</a:t>
+              <a:t>6/5/25</a:t>
             </a:fld>
             <a:endParaRPr lang="en-US"/>
           </a:p>
@@ -3789,7 +3789,7 @@
             </a:r>
             <a:r>
               <a:rPr lang="en-US" dirty="0"/>
-              <a:t> Workshop, June 25-26, 2024</a:t>
+              <a:t> Workshop, June 5-6, 2025</a:t>
             </a:r>
           </a:p>
         </p:txBody>

</xml_diff>